<commit_message>
Attempt to fix issue.
</commit_message>
<xml_diff>
--- a/Extras/Presentation - Mini Defense.pptx
+++ b/Extras/Presentation - Mini Defense.pptx
@@ -7,18 +7,19 @@
   <p:sldIdLst>
     <p:sldId id="256" r:id="rId2"/>
     <p:sldId id="257" r:id="rId3"/>
-    <p:sldId id="258" r:id="rId4"/>
-    <p:sldId id="259" r:id="rId5"/>
-    <p:sldId id="260" r:id="rId6"/>
-    <p:sldId id="270" r:id="rId7"/>
-    <p:sldId id="271" r:id="rId8"/>
-    <p:sldId id="272" r:id="rId9"/>
-    <p:sldId id="273" r:id="rId10"/>
-    <p:sldId id="263" r:id="rId11"/>
-    <p:sldId id="265" r:id="rId12"/>
-    <p:sldId id="274" r:id="rId13"/>
-    <p:sldId id="266" r:id="rId14"/>
-    <p:sldId id="267" r:id="rId15"/>
+    <p:sldId id="275" r:id="rId4"/>
+    <p:sldId id="258" r:id="rId5"/>
+    <p:sldId id="259" r:id="rId6"/>
+    <p:sldId id="260" r:id="rId7"/>
+    <p:sldId id="270" r:id="rId8"/>
+    <p:sldId id="271" r:id="rId9"/>
+    <p:sldId id="272" r:id="rId10"/>
+    <p:sldId id="273" r:id="rId11"/>
+    <p:sldId id="263" r:id="rId12"/>
+    <p:sldId id="265" r:id="rId13"/>
+    <p:sldId id="274" r:id="rId14"/>
+    <p:sldId id="266" r:id="rId15"/>
+    <p:sldId id="267" r:id="rId16"/>
   </p:sldIdLst>
   <p:sldSz cx="12192000" cy="6858000"/>
   <p:notesSz cx="6858000" cy="9144000"/>
@@ -272,7 +273,7 @@
           <a:p>
             <a:fld id="{6539D360-C664-432B-9E88-47790D18ADC6}" type="datetimeFigureOut">
               <a:rPr lang="en-US" smtClean="0"/>
-              <a:t>11/22/2022</a:t>
+              <a:t>4/18/2023</a:t>
             </a:fld>
             <a:endParaRPr lang="en-US"/>
           </a:p>
@@ -470,7 +471,7 @@
           <a:p>
             <a:fld id="{6539D360-C664-432B-9E88-47790D18ADC6}" type="datetimeFigureOut">
               <a:rPr lang="en-US" smtClean="0"/>
-              <a:t>11/22/2022</a:t>
+              <a:t>4/18/2023</a:t>
             </a:fld>
             <a:endParaRPr lang="en-US"/>
           </a:p>
@@ -678,7 +679,7 @@
           <a:p>
             <a:fld id="{6539D360-C664-432B-9E88-47790D18ADC6}" type="datetimeFigureOut">
               <a:rPr lang="en-US" smtClean="0"/>
-              <a:t>11/22/2022</a:t>
+              <a:t>4/18/2023</a:t>
             </a:fld>
             <a:endParaRPr lang="en-US"/>
           </a:p>
@@ -876,7 +877,7 @@
           <a:p>
             <a:fld id="{6539D360-C664-432B-9E88-47790D18ADC6}" type="datetimeFigureOut">
               <a:rPr lang="en-US" smtClean="0"/>
-              <a:t>11/22/2022</a:t>
+              <a:t>4/18/2023</a:t>
             </a:fld>
             <a:endParaRPr lang="en-US"/>
           </a:p>
@@ -1151,7 +1152,7 @@
           <a:p>
             <a:fld id="{6539D360-C664-432B-9E88-47790D18ADC6}" type="datetimeFigureOut">
               <a:rPr lang="en-US" smtClean="0"/>
-              <a:t>11/22/2022</a:t>
+              <a:t>4/18/2023</a:t>
             </a:fld>
             <a:endParaRPr lang="en-US"/>
           </a:p>
@@ -1416,7 +1417,7 @@
           <a:p>
             <a:fld id="{6539D360-C664-432B-9E88-47790D18ADC6}" type="datetimeFigureOut">
               <a:rPr lang="en-US" smtClean="0"/>
-              <a:t>11/22/2022</a:t>
+              <a:t>4/18/2023</a:t>
             </a:fld>
             <a:endParaRPr lang="en-US"/>
           </a:p>
@@ -1828,7 +1829,7 @@
           <a:p>
             <a:fld id="{6539D360-C664-432B-9E88-47790D18ADC6}" type="datetimeFigureOut">
               <a:rPr lang="en-US" smtClean="0"/>
-              <a:t>11/22/2022</a:t>
+              <a:t>4/18/2023</a:t>
             </a:fld>
             <a:endParaRPr lang="en-US"/>
           </a:p>
@@ -1969,7 +1970,7 @@
           <a:p>
             <a:fld id="{6539D360-C664-432B-9E88-47790D18ADC6}" type="datetimeFigureOut">
               <a:rPr lang="en-US" smtClean="0"/>
-              <a:t>11/22/2022</a:t>
+              <a:t>4/18/2023</a:t>
             </a:fld>
             <a:endParaRPr lang="en-US"/>
           </a:p>
@@ -2082,7 +2083,7 @@
           <a:p>
             <a:fld id="{6539D360-C664-432B-9E88-47790D18ADC6}" type="datetimeFigureOut">
               <a:rPr lang="en-US" smtClean="0"/>
-              <a:t>11/22/2022</a:t>
+              <a:t>4/18/2023</a:t>
             </a:fld>
             <a:endParaRPr lang="en-US"/>
           </a:p>
@@ -2393,7 +2394,7 @@
           <a:p>
             <a:fld id="{6539D360-C664-432B-9E88-47790D18ADC6}" type="datetimeFigureOut">
               <a:rPr lang="en-US" smtClean="0"/>
-              <a:t>11/22/2022</a:t>
+              <a:t>4/18/2023</a:t>
             </a:fld>
             <a:endParaRPr lang="en-US"/>
           </a:p>
@@ -2681,7 +2682,7 @@
           <a:p>
             <a:fld id="{6539D360-C664-432B-9E88-47790D18ADC6}" type="datetimeFigureOut">
               <a:rPr lang="en-US" smtClean="0"/>
-              <a:t>11/22/2022</a:t>
+              <a:t>4/18/2023</a:t>
             </a:fld>
             <a:endParaRPr lang="en-US"/>
           </a:p>
@@ -2922,7 +2923,7 @@
           <a:p>
             <a:fld id="{6539D360-C664-432B-9E88-47790D18ADC6}" type="datetimeFigureOut">
               <a:rPr lang="en-US" smtClean="0"/>
-              <a:t>11/22/2022</a:t>
+              <a:t>4/18/2023</a:t>
             </a:fld>
             <a:endParaRPr lang="en-US"/>
           </a:p>
@@ -3553,6 +3554,244 @@
       </p:grpSpPr>
       <p:sp>
         <p:nvSpPr>
+          <p:cNvPr id="3" name="Content Placeholder 2">
+            <a:extLst>
+              <a:ext uri="{FF2B5EF4-FFF2-40B4-BE49-F238E27FC236}">
+                <a16:creationId xmlns:a16="http://schemas.microsoft.com/office/drawing/2014/main" id="{BBF4E5E7-0C81-CE50-AA25-17953BC8903E}"/>
+              </a:ext>
+            </a:extLst>
+          </p:cNvPr>
+          <p:cNvSpPr>
+            <a:spLocks noGrp="1"/>
+          </p:cNvSpPr>
+          <p:nvPr>
+            <p:ph idx="1"/>
+          </p:nvPr>
+        </p:nvSpPr>
+        <p:spPr>
+          <a:xfrm>
+            <a:off x="838200" y="1825625"/>
+            <a:ext cx="10515600" cy="4351338"/>
+          </a:xfrm>
+        </p:spPr>
+        <p:txBody>
+          <a:bodyPr>
+            <a:normAutofit fontScale="92500"/>
+          </a:bodyPr>
+          <a:lstStyle/>
+          <a:p>
+            <a:pPr marL="0" indent="0">
+              <a:buNone/>
+            </a:pPr>
+            <a:r>
+              <a:rPr lang="en-US" dirty="0"/>
+              <a:t>The design/implementation tools for this system include:</a:t>
+            </a:r>
+          </a:p>
+          <a:p>
+            <a:r>
+              <a:rPr lang="en-US" dirty="0"/>
+              <a:t>Microsoft Visual Studio Code: Integrated Development Environment.</a:t>
+            </a:r>
+          </a:p>
+          <a:p>
+            <a:r>
+              <a:rPr lang="en-US" dirty="0"/>
+              <a:t>Sci-kit Learn: Python Machine Learning library (</a:t>
+            </a:r>
+            <a:r>
+              <a:rPr lang="en-US" dirty="0" err="1"/>
+              <a:t>Lng</a:t>
+            </a:r>
+            <a:r>
+              <a:rPr lang="en-US" dirty="0"/>
+              <a:t>. detection)</a:t>
+            </a:r>
+          </a:p>
+          <a:p>
+            <a:r>
+              <a:rPr lang="en-US" dirty="0"/>
+              <a:t>NLTK: Python Natural language processing library (Topic pred. &amp; Summary)</a:t>
+            </a:r>
+          </a:p>
+          <a:p>
+            <a:r>
+              <a:rPr lang="en-US" dirty="0"/>
+              <a:t>Flask: Python Back-end library/Framework</a:t>
+            </a:r>
+          </a:p>
+          <a:p>
+            <a:r>
+              <a:rPr lang="en-US" dirty="0"/>
+              <a:t>HTML: Front-end structure definition.</a:t>
+            </a:r>
+          </a:p>
+          <a:p>
+            <a:r>
+              <a:rPr lang="en-US" dirty="0"/>
+              <a:t>CSS: Front-end structure design.</a:t>
+            </a:r>
+          </a:p>
+          <a:p>
+            <a:r>
+              <a:rPr lang="en-US" dirty="0"/>
+              <a:t>JavaScript: Front-end dynamic content management.</a:t>
+            </a:r>
+          </a:p>
+          <a:p>
+            <a:r>
+              <a:rPr lang="en-US" dirty="0"/>
+              <a:t>Figma: UI/UX design</a:t>
+            </a:r>
+          </a:p>
+          <a:p>
+            <a:pPr marL="0" indent="0">
+              <a:buNone/>
+            </a:pPr>
+            <a:endParaRPr lang="en-US" dirty="0"/>
+          </a:p>
+        </p:txBody>
+      </p:sp>
+      <p:sp>
+        <p:nvSpPr>
+          <p:cNvPr id="4" name="Title 1">
+            <a:extLst>
+              <a:ext uri="{FF2B5EF4-FFF2-40B4-BE49-F238E27FC236}">
+                <a16:creationId xmlns:a16="http://schemas.microsoft.com/office/drawing/2014/main" id="{3382EF16-CF2C-0284-70B4-76B21E0F80D7}"/>
+              </a:ext>
+            </a:extLst>
+          </p:cNvPr>
+          <p:cNvSpPr txBox="1">
+            <a:spLocks/>
+          </p:cNvSpPr>
+          <p:nvPr/>
+        </p:nvSpPr>
+        <p:spPr>
+          <a:xfrm>
+            <a:off x="838200" y="336061"/>
+            <a:ext cx="10515600" cy="689952"/>
+          </a:xfrm>
+          <a:prstGeom prst="rect">
+            <a:avLst/>
+          </a:prstGeom>
+        </p:spPr>
+        <p:txBody>
+          <a:bodyPr vert="horz" lIns="91440" tIns="45720" rIns="91440" bIns="45720" rtlCol="0" anchor="ctr">
+            <a:normAutofit fontScale="97500"/>
+          </a:bodyPr>
+          <a:lstStyle>
+            <a:lvl1pPr algn="l" defTabSz="914400" rtl="0" eaLnBrk="1" latinLnBrk="0" hangingPunct="1">
+              <a:lnSpc>
+                <a:spcPct val="90000"/>
+              </a:lnSpc>
+              <a:spcBef>
+                <a:spcPct val="0"/>
+              </a:spcBef>
+              <a:buNone/>
+              <a:defRPr sz="4400" kern="1200">
+                <a:solidFill>
+                  <a:schemeClr val="tx1"/>
+                </a:solidFill>
+                <a:latin typeface="+mj-lt"/>
+                <a:ea typeface="+mj-ea"/>
+                <a:cs typeface="+mj-cs"/>
+              </a:defRPr>
+            </a:lvl1pPr>
+          </a:lstStyle>
+          <a:p>
+            <a:r>
+              <a:rPr lang="en-US" sz="4300" b="1" dirty="0"/>
+              <a:t>Methodology.</a:t>
+            </a:r>
+          </a:p>
+        </p:txBody>
+      </p:sp>
+      <p:sp>
+        <p:nvSpPr>
+          <p:cNvPr id="5" name="Title 1">
+            <a:extLst>
+              <a:ext uri="{FF2B5EF4-FFF2-40B4-BE49-F238E27FC236}">
+                <a16:creationId xmlns:a16="http://schemas.microsoft.com/office/drawing/2014/main" id="{6610BD88-4B4B-2708-7656-7680550616F1}"/>
+              </a:ext>
+            </a:extLst>
+          </p:cNvPr>
+          <p:cNvSpPr txBox="1">
+            <a:spLocks/>
+          </p:cNvSpPr>
+          <p:nvPr/>
+        </p:nvSpPr>
+        <p:spPr>
+          <a:xfrm>
+            <a:off x="838200" y="809770"/>
+            <a:ext cx="10515600" cy="689952"/>
+          </a:xfrm>
+          <a:prstGeom prst="rect">
+            <a:avLst/>
+          </a:prstGeom>
+        </p:spPr>
+        <p:txBody>
+          <a:bodyPr vert="horz" lIns="91440" tIns="45720" rIns="91440" bIns="45720" rtlCol="0" anchor="ctr">
+            <a:normAutofit fontScale="97500"/>
+          </a:bodyPr>
+          <a:lstStyle>
+            <a:lvl1pPr algn="l" defTabSz="914400" rtl="0" eaLnBrk="1" latinLnBrk="0" hangingPunct="1">
+              <a:lnSpc>
+                <a:spcPct val="90000"/>
+              </a:lnSpc>
+              <a:spcBef>
+                <a:spcPct val="0"/>
+              </a:spcBef>
+              <a:buNone/>
+              <a:defRPr sz="4400" kern="1200">
+                <a:solidFill>
+                  <a:schemeClr val="tx1"/>
+                </a:solidFill>
+                <a:latin typeface="+mj-lt"/>
+                <a:ea typeface="+mj-ea"/>
+                <a:cs typeface="+mj-cs"/>
+              </a:defRPr>
+            </a:lvl1pPr>
+          </a:lstStyle>
+          <a:p>
+            <a:r>
+              <a:rPr lang="en-US" sz="2800" b="1" dirty="0"/>
+              <a:t>Design/Implementation Tools</a:t>
+            </a:r>
+          </a:p>
+        </p:txBody>
+      </p:sp>
+    </p:spTree>
+    <p:extLst>
+      <p:ext uri="{BB962C8B-B14F-4D97-AF65-F5344CB8AC3E}">
+        <p14:creationId xmlns:p14="http://schemas.microsoft.com/office/powerpoint/2010/main" val="3873210646"/>
+      </p:ext>
+    </p:extLst>
+  </p:cSld>
+  <p:clrMapOvr>
+    <a:masterClrMapping/>
+  </p:clrMapOvr>
+</p:sld>
+</file>
+
+<file path=ppt/slides/slide11.xml><?xml version="1.0" encoding="utf-8"?>
+<p:sld xmlns:a="http://schemas.openxmlformats.org/drawingml/2006/main" xmlns:r="http://schemas.openxmlformats.org/officeDocument/2006/relationships" xmlns:p="http://schemas.openxmlformats.org/presentationml/2006/main">
+  <p:cSld>
+    <p:spTree>
+      <p:nvGrpSpPr>
+        <p:cNvPr id="1" name=""/>
+        <p:cNvGrpSpPr/>
+        <p:nvPr/>
+      </p:nvGrpSpPr>
+      <p:grpSpPr>
+        <a:xfrm>
+          <a:off x="0" y="0"/>
+          <a:ext cx="0" cy="0"/>
+          <a:chOff x="0" y="0"/>
+          <a:chExt cx="0" cy="0"/>
+        </a:xfrm>
+      </p:grpSpPr>
+      <p:sp>
+        <p:nvSpPr>
           <p:cNvPr id="2" name="Title 1">
             <a:extLst>
               <a:ext uri="{FF2B5EF4-FFF2-40B4-BE49-F238E27FC236}">
@@ -3655,7 +3894,7 @@
 </p:sld>
 </file>
 
-<file path=ppt/slides/slide11.xml><?xml version="1.0" encoding="utf-8"?>
+<file path=ppt/slides/slide12.xml><?xml version="1.0" encoding="utf-8"?>
 <p:sld xmlns:a="http://schemas.openxmlformats.org/drawingml/2006/main" xmlns:r="http://schemas.openxmlformats.org/officeDocument/2006/relationships" xmlns:p="http://schemas.openxmlformats.org/presentationml/2006/main">
   <p:cSld>
     <p:spTree>
@@ -4140,7 +4379,7 @@
 </p:sld>
 </file>
 
-<file path=ppt/slides/slide12.xml><?xml version="1.0" encoding="utf-8"?>
+<file path=ppt/slides/slide13.xml><?xml version="1.0" encoding="utf-8"?>
 <p:sld xmlns:a="http://schemas.openxmlformats.org/drawingml/2006/main" xmlns:r="http://schemas.openxmlformats.org/officeDocument/2006/relationships" xmlns:p="http://schemas.openxmlformats.org/presentationml/2006/main">
   <p:cSld>
     <p:spTree>
@@ -4652,7 +4891,7 @@
 </p:sld>
 </file>
 
-<file path=ppt/slides/slide13.xml><?xml version="1.0" encoding="utf-8"?>
+<file path=ppt/slides/slide14.xml><?xml version="1.0" encoding="utf-8"?>
 <p:sld xmlns:a="http://schemas.openxmlformats.org/drawingml/2006/main" xmlns:r="http://schemas.openxmlformats.org/officeDocument/2006/relationships" xmlns:p="http://schemas.openxmlformats.org/presentationml/2006/main">
   <p:cSld>
     <p:spTree>
@@ -4773,7 +5012,7 @@
 </p:sld>
 </file>
 
-<file path=ppt/slides/slide14.xml><?xml version="1.0" encoding="utf-8"?>
+<file path=ppt/slides/slide15.xml><?xml version="1.0" encoding="utf-8"?>
 <p:sld xmlns:a="http://schemas.openxmlformats.org/drawingml/2006/main" xmlns:r="http://schemas.openxmlformats.org/officeDocument/2006/relationships" xmlns:p="http://schemas.openxmlformats.org/presentationml/2006/main">
   <p:cSld>
     <p:spTree>
@@ -5100,7 +5339,7 @@
           <p:cNvPr id="2" name="Title 1">
             <a:extLst>
               <a:ext uri="{FF2B5EF4-FFF2-40B4-BE49-F238E27FC236}">
-                <a16:creationId xmlns:a16="http://schemas.microsoft.com/office/drawing/2014/main" id="{51F56B28-A24D-2C0E-7F23-0EDE5A037DDD}"/>
+                <a16:creationId xmlns:a16="http://schemas.microsoft.com/office/drawing/2014/main" id="{5FFAAA1A-CB79-E0F5-9C3A-4E41BCD93CD7}"/>
               </a:ext>
             </a:extLst>
           </p:cNvPr>
@@ -5116,65 +5355,53 @@
           <a:bodyPr/>
           <a:lstStyle/>
           <a:p>
-            <a:r>
-              <a:rPr lang="en-US" b="1" dirty="0"/>
-              <a:t>Introduction.</a:t>
-            </a:r>
-          </a:p>
-        </p:txBody>
-      </p:sp>
-      <p:sp>
-        <p:nvSpPr>
-          <p:cNvPr id="3" name="Content Placeholder 2">
-            <a:extLst>
-              <a:ext uri="{FF2B5EF4-FFF2-40B4-BE49-F238E27FC236}">
-                <a16:creationId xmlns:a16="http://schemas.microsoft.com/office/drawing/2014/main" id="{32E5AEFF-0C24-03AD-0C8D-BE0881AB7D02}"/>
-              </a:ext>
-            </a:extLst>
-          </p:cNvPr>
-          <p:cNvSpPr>
-            <a:spLocks noGrp="1"/>
-          </p:cNvSpPr>
+            <a:pPr algn="ctr"/>
+            <a:r>
+              <a:rPr lang="en-US" dirty="0"/>
+              <a:t>Scan QR to Access System</a:t>
+            </a:r>
+          </a:p>
+        </p:txBody>
+      </p:sp>
+      <p:pic>
+        <p:nvPicPr>
+          <p:cNvPr id="5" name="Content Placeholder 4">
+            <a:extLst>
+              <a:ext uri="{FF2B5EF4-FFF2-40B4-BE49-F238E27FC236}">
+                <a16:creationId xmlns:a16="http://schemas.microsoft.com/office/drawing/2014/main" id="{F061A39C-D808-6F9F-3793-B1178E73F0E2}"/>
+              </a:ext>
+            </a:extLst>
+          </p:cNvPr>
+          <p:cNvPicPr>
+            <a:picLocks noGrp="1" noChangeAspect="1"/>
+          </p:cNvPicPr>
           <p:nvPr>
             <p:ph idx="1"/>
           </p:nvPr>
-        </p:nvSpPr>
-        <p:spPr/>
-        <p:txBody>
-          <a:bodyPr>
-            <a:normAutofit lnSpcReduction="10000"/>
-          </a:bodyPr>
-          <a:lstStyle/>
-          <a:p>
-            <a:pPr marL="0" indent="0">
-              <a:buNone/>
-            </a:pPr>
-            <a:r>
-              <a:rPr lang="en-US" dirty="0"/>
-              <a:t>With the increasing amount of information being generated through technology and the need for quick information processing, extracting the key information embedded in large body of text has become almost unachievable for individuals from various backgrounds such as education, medicine, tourism, law, and many more.</a:t>
-            </a:r>
-          </a:p>
-          <a:p>
-            <a:pPr marL="0" indent="0">
-              <a:buNone/>
-            </a:pPr>
-            <a:endParaRPr lang="en-US" dirty="0"/>
-          </a:p>
-          <a:p>
-            <a:pPr marL="0" indent="0">
-              <a:buNone/>
-            </a:pPr>
-            <a:r>
-              <a:rPr lang="en-US" dirty="0"/>
-              <a:t>However, because of technological advancements and the existence of Artificial Intelligence (AI), with a focus on Natural Language Processing (NLP), the work of summarizing has become a very seamless task; systems such as this are now very capable of churning large bodies of text while also withholding the semantics.</a:t>
-            </a:r>
-          </a:p>
-        </p:txBody>
-      </p:sp>
+        </p:nvPicPr>
+        <p:blipFill>
+          <a:blip r:embed="rId2">
+            <a:extLst>
+              <a:ext uri="{28A0092B-C50C-407E-A947-70E740481C1C}">
+                <a14:useLocalDpi xmlns:a14="http://schemas.microsoft.com/office/drawing/2010/main" val="0"/>
+              </a:ext>
+            </a:extLst>
+          </a:blip>
+          <a:stretch>
+            <a:fillRect/>
+          </a:stretch>
+        </p:blipFill>
+        <p:spPr>
+          <a:xfrm>
+            <a:off x="3587261" y="1436281"/>
+            <a:ext cx="5072722" cy="5072722"/>
+          </a:xfrm>
+        </p:spPr>
+      </p:pic>
     </p:spTree>
     <p:extLst>
       <p:ext uri="{BB962C8B-B14F-4D97-AF65-F5344CB8AC3E}">
-        <p14:creationId xmlns:p14="http://schemas.microsoft.com/office/powerpoint/2010/main" val="1472240192"/>
+        <p14:creationId xmlns:p14="http://schemas.microsoft.com/office/powerpoint/2010/main" val="574508948"/>
       </p:ext>
     </p:extLst>
   </p:cSld>
@@ -5206,7 +5433,7 @@
           <p:cNvPr id="2" name="Title 1">
             <a:extLst>
               <a:ext uri="{FF2B5EF4-FFF2-40B4-BE49-F238E27FC236}">
-                <a16:creationId xmlns:a16="http://schemas.microsoft.com/office/drawing/2014/main" id="{E3D19BCC-7683-CBCC-E400-7C5AC6182A85}"/>
+                <a16:creationId xmlns:a16="http://schemas.microsoft.com/office/drawing/2014/main" id="{51F56B28-A24D-2C0E-7F23-0EDE5A037DDD}"/>
               </a:ext>
             </a:extLst>
           </p:cNvPr>
@@ -5217,19 +5444,14 @@
             <p:ph type="title"/>
           </p:nvPr>
         </p:nvSpPr>
-        <p:spPr>
-          <a:xfrm>
-            <a:off x="824132" y="365125"/>
-            <a:ext cx="10515600" cy="1325563"/>
-          </a:xfrm>
-        </p:spPr>
+        <p:spPr/>
         <p:txBody>
           <a:bodyPr/>
           <a:lstStyle/>
           <a:p>
             <a:r>
               <a:rPr lang="en-US" b="1" dirty="0"/>
-              <a:t>Statement of the Problem</a:t>
+              <a:t>Introduction.</a:t>
             </a:r>
           </a:p>
         </p:txBody>
@@ -5239,7 +5461,7 @@
           <p:cNvPr id="3" name="Content Placeholder 2">
             <a:extLst>
               <a:ext uri="{FF2B5EF4-FFF2-40B4-BE49-F238E27FC236}">
-                <a16:creationId xmlns:a16="http://schemas.microsoft.com/office/drawing/2014/main" id="{5C177F69-5ADE-8EDC-C94E-EC2E8BED8199}"/>
+                <a16:creationId xmlns:a16="http://schemas.microsoft.com/office/drawing/2014/main" id="{32E5AEFF-0C24-03AD-0C8D-BE0881AB7D02}"/>
               </a:ext>
             </a:extLst>
           </p:cNvPr>
@@ -5250,15 +5472,10 @@
             <p:ph idx="1"/>
           </p:nvPr>
         </p:nvSpPr>
-        <p:spPr>
-          <a:xfrm>
-            <a:off x="824132" y="1336431"/>
-            <a:ext cx="10515600" cy="4840532"/>
-          </a:xfrm>
-        </p:spPr>
+        <p:spPr/>
         <p:txBody>
           <a:bodyPr>
-            <a:normAutofit/>
+            <a:normAutofit lnSpcReduction="10000"/>
           </a:bodyPr>
           <a:lstStyle/>
           <a:p>
@@ -5267,7 +5484,7 @@
             </a:pPr>
             <a:r>
               <a:rPr lang="en-US" dirty="0"/>
-              <a:t>The vastness of the information available online has brought about several pros and cons, some of which this research wishes to address. Some of the problems which the advancement of technology and influx in information has lead to the following problems:</a:t>
+              <a:t>With the increasing amount of information being generated through technology and the need for quick information processing, extracting the key information embedded in large body of text has become almost unachievable for individuals from various backgrounds such as education, medicine, tourism, law, and many more.</a:t>
             </a:r>
           </a:p>
           <a:p>
@@ -5277,15 +5494,12 @@
             <a:endParaRPr lang="en-US" dirty="0"/>
           </a:p>
           <a:p>
+            <a:pPr marL="0" indent="0">
+              <a:buNone/>
+            </a:pPr>
             <a:r>
               <a:rPr lang="en-US" dirty="0"/>
-              <a:t>The issue of topic identification.</a:t>
-            </a:r>
-          </a:p>
-          <a:p>
-            <a:r>
-              <a:rPr lang="en-US" dirty="0"/>
-              <a:t>The issue of key point filtering in large bodies of text.</a:t>
+              <a:t>However, because of technological advancements and the existence of Artificial Intelligence (AI), with a focus on Natural Language Processing (NLP), the work of summarizing has become a very seamless task; systems such as this are now very capable of churning large bodies of text while also withholding the semantics.</a:t>
             </a:r>
           </a:p>
         </p:txBody>
@@ -5293,7 +5507,7 @@
     </p:spTree>
     <p:extLst>
       <p:ext uri="{BB962C8B-B14F-4D97-AF65-F5344CB8AC3E}">
-        <p14:creationId xmlns:p14="http://schemas.microsoft.com/office/powerpoint/2010/main" val="273186891"/>
+        <p14:creationId xmlns:p14="http://schemas.microsoft.com/office/powerpoint/2010/main" val="1472240192"/>
       </p:ext>
     </p:extLst>
   </p:cSld>
@@ -5325,7 +5539,7 @@
           <p:cNvPr id="2" name="Title 1">
             <a:extLst>
               <a:ext uri="{FF2B5EF4-FFF2-40B4-BE49-F238E27FC236}">
-                <a16:creationId xmlns:a16="http://schemas.microsoft.com/office/drawing/2014/main" id="{C62DD9E1-050C-84DD-F645-073F549EAA9A}"/>
+                <a16:creationId xmlns:a16="http://schemas.microsoft.com/office/drawing/2014/main" id="{E3D19BCC-7683-CBCC-E400-7C5AC6182A85}"/>
               </a:ext>
             </a:extLst>
           </p:cNvPr>
@@ -5336,14 +5550,19 @@
             <p:ph type="title"/>
           </p:nvPr>
         </p:nvSpPr>
-        <p:spPr/>
+        <p:spPr>
+          <a:xfrm>
+            <a:off x="824132" y="365125"/>
+            <a:ext cx="10515600" cy="1325563"/>
+          </a:xfrm>
+        </p:spPr>
         <p:txBody>
           <a:bodyPr/>
           <a:lstStyle/>
           <a:p>
             <a:r>
               <a:rPr lang="en-US" b="1" dirty="0"/>
-              <a:t>Aim and Objectives.</a:t>
+              <a:t>Statement of the Problem</a:t>
             </a:r>
           </a:p>
         </p:txBody>
@@ -5353,7 +5572,7 @@
           <p:cNvPr id="3" name="Content Placeholder 2">
             <a:extLst>
               <a:ext uri="{FF2B5EF4-FFF2-40B4-BE49-F238E27FC236}">
-                <a16:creationId xmlns:a16="http://schemas.microsoft.com/office/drawing/2014/main" id="{9F0DEF2A-8C94-1E0B-870C-C0C1891B346E}"/>
+                <a16:creationId xmlns:a16="http://schemas.microsoft.com/office/drawing/2014/main" id="{5C177F69-5ADE-8EDC-C94E-EC2E8BED8199}"/>
               </a:ext>
             </a:extLst>
           </p:cNvPr>
@@ -5366,8 +5585,8 @@
         </p:nvSpPr>
         <p:spPr>
           <a:xfrm>
-            <a:off x="838200" y="1825625"/>
-            <a:ext cx="10515600" cy="4351338"/>
+            <a:off x="824132" y="1336431"/>
+            <a:ext cx="10515600" cy="4840532"/>
           </a:xfrm>
         </p:spPr>
         <p:txBody>
@@ -5376,22 +5595,16 @@
           </a:bodyPr>
           <a:lstStyle/>
           <a:p>
+            <a:pPr marL="0" indent="0">
+              <a:buNone/>
+            </a:pPr>
             <a:r>
               <a:rPr lang="en-US" dirty="0"/>
-              <a:t>AIM:</a:t>
-            </a:r>
-          </a:p>
-          <a:p>
-            <a:pPr marL="457200" lvl="1" indent="0">
-              <a:buNone/>
-            </a:pPr>
-            <a:r>
-              <a:rPr lang="en-US" dirty="0"/>
-              <a:t>To develop and implement a web-based document summarization and topic prediction system using natural language processing which is able to summarize text, predict topic, convert text summary to speech.</a:t>
-            </a:r>
-          </a:p>
-          <a:p>
-            <a:pPr marL="457200" lvl="1" indent="0">
+              <a:t>The vastness of the information available online has brought about several pros and cons, some of which this research wishes to address. Some of the problems which the advancement of technology and influx in information has lead to the following problems:</a:t>
+            </a:r>
+          </a:p>
+          <a:p>
+            <a:pPr marL="0" indent="0">
               <a:buNone/>
             </a:pPr>
             <a:endParaRPr lang="en-US" dirty="0"/>
@@ -5399,28 +5612,13 @@
           <a:p>
             <a:r>
               <a:rPr lang="en-US" dirty="0"/>
-              <a:t>OBJECTIVES:</a:t>
-            </a:r>
-          </a:p>
-          <a:p>
-            <a:pPr lvl="1"/>
+              <a:t>The issue of topic identification.</a:t>
+            </a:r>
+          </a:p>
+          <a:p>
             <a:r>
               <a:rPr lang="en-US" dirty="0"/>
-              <a:t>To develop and implement a text summarizing, language detection model.</a:t>
-            </a:r>
-          </a:p>
-          <a:p>
-            <a:pPr lvl="1"/>
-            <a:r>
-              <a:rPr lang="en-US" dirty="0"/>
-              <a:t>To Integrate the text summarizing and language detection model</a:t>
-            </a:r>
-          </a:p>
-          <a:p>
-            <a:pPr lvl="1"/>
-            <a:r>
-              <a:rPr lang="en-US" dirty="0"/>
-              <a:t>To conduct an evaluation of the proposed system.</a:t>
+              <a:t>The issue of key point filtering in large bodies of text.</a:t>
             </a:r>
           </a:p>
         </p:txBody>
@@ -5428,7 +5626,7 @@
     </p:spTree>
     <p:extLst>
       <p:ext uri="{BB962C8B-B14F-4D97-AF65-F5344CB8AC3E}">
-        <p14:creationId xmlns:p14="http://schemas.microsoft.com/office/powerpoint/2010/main" val="2030600589"/>
+        <p14:creationId xmlns:p14="http://schemas.microsoft.com/office/powerpoint/2010/main" val="273186891"/>
       </p:ext>
     </p:extLst>
   </p:cSld>
@@ -5457,18 +5655,18 @@
       </p:grpSpPr>
       <p:sp>
         <p:nvSpPr>
-          <p:cNvPr id="3" name="Content Placeholder 2">
-            <a:extLst>
-              <a:ext uri="{FF2B5EF4-FFF2-40B4-BE49-F238E27FC236}">
-                <a16:creationId xmlns:a16="http://schemas.microsoft.com/office/drawing/2014/main" id="{70885EA7-49EF-B647-77E7-F7E91F5B9642}"/>
-              </a:ext>
-            </a:extLst>
-          </p:cNvPr>
-          <p:cNvSpPr>
-            <a:spLocks noGrp="1"/>
-          </p:cNvSpPr>
-          <p:nvPr>
-            <p:ph idx="1"/>
+          <p:cNvPr id="2" name="Title 1">
+            <a:extLst>
+              <a:ext uri="{FF2B5EF4-FFF2-40B4-BE49-F238E27FC236}">
+                <a16:creationId xmlns:a16="http://schemas.microsoft.com/office/drawing/2014/main" id="{C62DD9E1-050C-84DD-F645-073F549EAA9A}"/>
+              </a:ext>
+            </a:extLst>
+          </p:cNvPr>
+          <p:cNvSpPr>
+            <a:spLocks noGrp="1"/>
+          </p:cNvSpPr>
+          <p:nvPr>
+            <p:ph type="title"/>
           </p:nvPr>
         </p:nvSpPr>
         <p:spPr/>
@@ -5476,233 +5674,86 @@
           <a:bodyPr/>
           <a:lstStyle/>
           <a:p>
-            <a:pPr marL="0" indent="0">
+            <a:r>
+              <a:rPr lang="en-US" b="1" dirty="0"/>
+              <a:t>Aim and Objectives.</a:t>
+            </a:r>
+          </a:p>
+        </p:txBody>
+      </p:sp>
+      <p:sp>
+        <p:nvSpPr>
+          <p:cNvPr id="3" name="Content Placeholder 2">
+            <a:extLst>
+              <a:ext uri="{FF2B5EF4-FFF2-40B4-BE49-F238E27FC236}">
+                <a16:creationId xmlns:a16="http://schemas.microsoft.com/office/drawing/2014/main" id="{9F0DEF2A-8C94-1E0B-870C-C0C1891B346E}"/>
+              </a:ext>
+            </a:extLst>
+          </p:cNvPr>
+          <p:cNvSpPr>
+            <a:spLocks noGrp="1"/>
+          </p:cNvSpPr>
+          <p:nvPr>
+            <p:ph idx="1"/>
+          </p:nvPr>
+        </p:nvSpPr>
+        <p:spPr>
+          <a:xfrm>
+            <a:off x="838200" y="1825625"/>
+            <a:ext cx="10515600" cy="4351338"/>
+          </a:xfrm>
+        </p:spPr>
+        <p:txBody>
+          <a:bodyPr>
+            <a:normAutofit/>
+          </a:bodyPr>
+          <a:lstStyle/>
+          <a:p>
+            <a:r>
+              <a:rPr lang="en-US" dirty="0"/>
+              <a:t>AIM:</a:t>
+            </a:r>
+          </a:p>
+          <a:p>
+            <a:pPr marL="457200" lvl="1" indent="0">
               <a:buNone/>
             </a:pPr>
             <a:r>
               <a:rPr lang="en-US" dirty="0"/>
-              <a:t>For the purpose of this project, the prototyping model will be adopted.</a:t>
-            </a:r>
-          </a:p>
-          <a:p>
-            <a:pPr marL="0" indent="0">
-              <a:buNone/>
-            </a:pPr>
-            <a:r>
-              <a:rPr lang="en-US" dirty="0"/>
-              <a:t>The </a:t>
-            </a:r>
-            <a:r>
-              <a:rPr lang="en-US" b="1" dirty="0"/>
-              <a:t>Prototyping Model</a:t>
-            </a:r>
-            <a:r>
-              <a:rPr lang="en-US" dirty="0"/>
-              <a:t> is a Systems Development Methodology that constructs, tests, and then reworks an ideal output or an early estimation of a final system or product. It is repeated until an appropriate standard is obtained to aid in the development of the entire system or product. (Lewis, 2019)</a:t>
-            </a:r>
-          </a:p>
-          <a:p>
-            <a:pPr marL="0" indent="0">
+              <a:t>To develop and implement a web-based document summarization and topic prediction system using natural language processing which is able to summarize text, predict topic, convert text summary to speech.</a:t>
+            </a:r>
+          </a:p>
+          <a:p>
+            <a:pPr marL="457200" lvl="1" indent="0">
               <a:buNone/>
             </a:pPr>
             <a:endParaRPr lang="en-US" dirty="0"/>
           </a:p>
-        </p:txBody>
-      </p:sp>
-      <p:sp>
-        <p:nvSpPr>
-          <p:cNvPr id="4" name="Title 1">
-            <a:extLst>
-              <a:ext uri="{FF2B5EF4-FFF2-40B4-BE49-F238E27FC236}">
-                <a16:creationId xmlns:a16="http://schemas.microsoft.com/office/drawing/2014/main" id="{EB8EB6C9-4A8E-B4E3-EB6A-317DEB16870A}"/>
-              </a:ext>
-            </a:extLst>
-          </p:cNvPr>
-          <p:cNvSpPr txBox="1">
-            <a:spLocks/>
-          </p:cNvSpPr>
-          <p:nvPr/>
-        </p:nvSpPr>
-        <p:spPr>
-          <a:xfrm>
-            <a:off x="810064" y="336061"/>
-            <a:ext cx="10515600" cy="689952"/>
-          </a:xfrm>
-          <a:prstGeom prst="rect">
-            <a:avLst/>
-          </a:prstGeom>
-        </p:spPr>
-        <p:txBody>
-          <a:bodyPr vert="horz" lIns="91440" tIns="45720" rIns="91440" bIns="45720" rtlCol="0" anchor="ctr">
-            <a:normAutofit fontScale="97500"/>
-          </a:bodyPr>
-          <a:lstStyle>
-            <a:lvl1pPr algn="l" defTabSz="914400" rtl="0" eaLnBrk="1" latinLnBrk="0" hangingPunct="1">
-              <a:lnSpc>
-                <a:spcPct val="90000"/>
-              </a:lnSpc>
-              <a:spcBef>
-                <a:spcPct val="0"/>
-              </a:spcBef>
-              <a:buNone/>
-              <a:defRPr sz="4400" kern="1200">
-                <a:solidFill>
-                  <a:schemeClr val="tx1"/>
-                </a:solidFill>
-                <a:latin typeface="+mj-lt"/>
-                <a:ea typeface="+mj-ea"/>
-                <a:cs typeface="+mj-cs"/>
-              </a:defRPr>
-            </a:lvl1pPr>
-          </a:lstStyle>
-          <a:p>
-            <a:r>
-              <a:rPr lang="en-US" b="1" dirty="0"/>
-              <a:t>Methodology.</a:t>
-            </a:r>
-          </a:p>
-        </p:txBody>
-      </p:sp>
-      <p:sp>
-        <p:nvSpPr>
-          <p:cNvPr id="7" name="Title 1">
-            <a:extLst>
-              <a:ext uri="{FF2B5EF4-FFF2-40B4-BE49-F238E27FC236}">
-                <a16:creationId xmlns:a16="http://schemas.microsoft.com/office/drawing/2014/main" id="{7AE0CE8D-11FB-2995-0E11-915BFA339474}"/>
-              </a:ext>
-            </a:extLst>
-          </p:cNvPr>
-          <p:cNvSpPr txBox="1">
-            <a:spLocks/>
-          </p:cNvSpPr>
-          <p:nvPr/>
-        </p:nvSpPr>
-        <p:spPr>
-          <a:xfrm>
-            <a:off x="810064" y="1135673"/>
-            <a:ext cx="10515600" cy="689952"/>
-          </a:xfrm>
-          <a:prstGeom prst="rect">
-            <a:avLst/>
-          </a:prstGeom>
-        </p:spPr>
-        <p:txBody>
-          <a:bodyPr vert="horz" lIns="91440" tIns="45720" rIns="91440" bIns="45720" rtlCol="0" anchor="ctr">
-            <a:normAutofit fontScale="97500"/>
-          </a:bodyPr>
-          <a:lstStyle>
-            <a:lvl1pPr algn="l" defTabSz="914400" rtl="0" eaLnBrk="1" latinLnBrk="0" hangingPunct="1">
-              <a:lnSpc>
-                <a:spcPct val="90000"/>
-              </a:lnSpc>
-              <a:spcBef>
-                <a:spcPct val="0"/>
-              </a:spcBef>
-              <a:buNone/>
-              <a:defRPr sz="4400" kern="1200">
-                <a:solidFill>
-                  <a:schemeClr val="tx1"/>
-                </a:solidFill>
-                <a:latin typeface="+mj-lt"/>
-                <a:ea typeface="+mj-ea"/>
-                <a:cs typeface="+mj-cs"/>
-              </a:defRPr>
-            </a:lvl1pPr>
-          </a:lstStyle>
-          <a:p>
-            <a:r>
-              <a:rPr lang="en-US" sz="2800" b="1" dirty="0"/>
-              <a:t>Process Model</a:t>
-            </a:r>
-          </a:p>
-        </p:txBody>
-      </p:sp>
-      <p:pic>
-        <p:nvPicPr>
-          <p:cNvPr id="8" name="Picture 7">
-            <a:extLst>
-              <a:ext uri="{FF2B5EF4-FFF2-40B4-BE49-F238E27FC236}">
-                <a16:creationId xmlns:a16="http://schemas.microsoft.com/office/drawing/2014/main" id="{CAC3C4D2-12EC-AB74-B665-F4F020A1B4F7}"/>
-              </a:ext>
-            </a:extLst>
-          </p:cNvPr>
-          <p:cNvPicPr>
-            <a:picLocks noChangeAspect="1"/>
-          </p:cNvPicPr>
-          <p:nvPr/>
-        </p:nvPicPr>
-        <p:blipFill>
-          <a:blip r:embed="rId2">
-            <a:extLst>
-              <a:ext uri="{28A0092B-C50C-407E-A947-70E740481C1C}">
-                <a14:useLocalDpi xmlns:a14="http://schemas.microsoft.com/office/drawing/2010/main" val="0"/>
-              </a:ext>
-            </a:extLst>
-          </a:blip>
-          <a:stretch>
-            <a:fillRect/>
-          </a:stretch>
-        </p:blipFill>
-        <p:spPr>
-          <a:xfrm>
-            <a:off x="838200" y="4350435"/>
-            <a:ext cx="8997531" cy="1882800"/>
-          </a:xfrm>
-          <a:prstGeom prst="rect">
-            <a:avLst/>
-          </a:prstGeom>
-        </p:spPr>
-      </p:pic>
-      <p:sp>
-        <p:nvSpPr>
-          <p:cNvPr id="6" name="Title 1">
-            <a:extLst>
-              <a:ext uri="{FF2B5EF4-FFF2-40B4-BE49-F238E27FC236}">
-                <a16:creationId xmlns:a16="http://schemas.microsoft.com/office/drawing/2014/main" id="{AE1E053D-E302-4ED8-9921-3209FE6DB7EF}"/>
-              </a:ext>
-            </a:extLst>
-          </p:cNvPr>
-          <p:cNvSpPr txBox="1">
-            <a:spLocks/>
-          </p:cNvSpPr>
-          <p:nvPr/>
-        </p:nvSpPr>
-        <p:spPr>
-          <a:xfrm>
-            <a:off x="2631003" y="6030301"/>
-            <a:ext cx="10515600" cy="689952"/>
-          </a:xfrm>
-          <a:prstGeom prst="rect">
-            <a:avLst/>
-          </a:prstGeom>
-        </p:spPr>
-        <p:txBody>
-          <a:bodyPr vert="horz" lIns="91440" tIns="45720" rIns="91440" bIns="45720" rtlCol="0" anchor="ctr">
-            <a:normAutofit fontScale="97500"/>
-          </a:bodyPr>
-          <a:lstStyle>
-            <a:lvl1pPr algn="l" defTabSz="914400" rtl="0" eaLnBrk="1" latinLnBrk="0" hangingPunct="1">
-              <a:lnSpc>
-                <a:spcPct val="90000"/>
-              </a:lnSpc>
-              <a:spcBef>
-                <a:spcPct val="0"/>
-              </a:spcBef>
-              <a:buNone/>
-              <a:defRPr sz="4400" kern="1200">
-                <a:solidFill>
-                  <a:schemeClr val="tx1"/>
-                </a:solidFill>
-                <a:latin typeface="+mj-lt"/>
-                <a:ea typeface="+mj-ea"/>
-                <a:cs typeface="+mj-cs"/>
-              </a:defRPr>
-            </a:lvl1pPr>
-          </a:lstStyle>
-          <a:p>
-            <a:r>
-              <a:rPr lang="en-US" sz="1600" b="1" i="1" dirty="0"/>
-              <a:t>Figure by (Martin, 2020) in article “Prototype Model in Software Engineering”</a:t>
+          <a:p>
+            <a:r>
+              <a:rPr lang="en-US" dirty="0"/>
+              <a:t>OBJECTIVES:</a:t>
+            </a:r>
+          </a:p>
+          <a:p>
+            <a:pPr lvl="1"/>
+            <a:r>
+              <a:rPr lang="en-US" dirty="0"/>
+              <a:t>To develop and implement a text summarizing, language detection model.</a:t>
+            </a:r>
+          </a:p>
+          <a:p>
+            <a:pPr lvl="1"/>
+            <a:r>
+              <a:rPr lang="en-US" dirty="0"/>
+              <a:t>To Integrate the text summarizing and language detection model</a:t>
+            </a:r>
+          </a:p>
+          <a:p>
+            <a:pPr lvl="1"/>
+            <a:r>
+              <a:rPr lang="en-US" dirty="0"/>
+              <a:t>To conduct an evaluation of the proposed system.</a:t>
             </a:r>
           </a:p>
         </p:txBody>
@@ -5710,7 +5761,7 @@
     </p:spTree>
     <p:extLst>
       <p:ext uri="{BB962C8B-B14F-4D97-AF65-F5344CB8AC3E}">
-        <p14:creationId xmlns:p14="http://schemas.microsoft.com/office/powerpoint/2010/main" val="3223567328"/>
+        <p14:creationId xmlns:p14="http://schemas.microsoft.com/office/powerpoint/2010/main" val="2030600589"/>
       </p:ext>
     </p:extLst>
   </p:cSld>
@@ -5739,10 +5790,64 @@
       </p:grpSpPr>
       <p:sp>
         <p:nvSpPr>
+          <p:cNvPr id="3" name="Content Placeholder 2">
+            <a:extLst>
+              <a:ext uri="{FF2B5EF4-FFF2-40B4-BE49-F238E27FC236}">
+                <a16:creationId xmlns:a16="http://schemas.microsoft.com/office/drawing/2014/main" id="{70885EA7-49EF-B647-77E7-F7E91F5B9642}"/>
+              </a:ext>
+            </a:extLst>
+          </p:cNvPr>
+          <p:cNvSpPr>
+            <a:spLocks noGrp="1"/>
+          </p:cNvSpPr>
+          <p:nvPr>
+            <p:ph idx="1"/>
+          </p:nvPr>
+        </p:nvSpPr>
+        <p:spPr/>
+        <p:txBody>
+          <a:bodyPr/>
+          <a:lstStyle/>
+          <a:p>
+            <a:pPr marL="0" indent="0">
+              <a:buNone/>
+            </a:pPr>
+            <a:r>
+              <a:rPr lang="en-US" dirty="0"/>
+              <a:t>For the purpose of this project, the prototyping model will be adopted.</a:t>
+            </a:r>
+          </a:p>
+          <a:p>
+            <a:pPr marL="0" indent="0">
+              <a:buNone/>
+            </a:pPr>
+            <a:r>
+              <a:rPr lang="en-US" dirty="0"/>
+              <a:t>The </a:t>
+            </a:r>
+            <a:r>
+              <a:rPr lang="en-US" b="1" dirty="0"/>
+              <a:t>Prototyping Model</a:t>
+            </a:r>
+            <a:r>
+              <a:rPr lang="en-US" dirty="0"/>
+              <a:t> is a Systems Development Methodology that constructs, tests, and then reworks an ideal output or an early estimation of a final system or product. It is repeated until an appropriate standard is obtained to aid in the development of the entire system or product. (Lewis, 2019)</a:t>
+            </a:r>
+          </a:p>
+          <a:p>
+            <a:pPr marL="0" indent="0">
+              <a:buNone/>
+            </a:pPr>
+            <a:endParaRPr lang="en-US" dirty="0"/>
+          </a:p>
+        </p:txBody>
+      </p:sp>
+      <p:sp>
+        <p:nvSpPr>
           <p:cNvPr id="4" name="Title 1">
             <a:extLst>
               <a:ext uri="{FF2B5EF4-FFF2-40B4-BE49-F238E27FC236}">
-                <a16:creationId xmlns:a16="http://schemas.microsoft.com/office/drawing/2014/main" id="{0739E809-6CA4-144F-66A0-3D5ECDA0A102}"/>
+                <a16:creationId xmlns:a16="http://schemas.microsoft.com/office/drawing/2014/main" id="{EB8EB6C9-4A8E-B4E3-EB6A-317DEB16870A}"/>
               </a:ext>
             </a:extLst>
           </p:cNvPr>
@@ -5753,7 +5858,7 @@
         </p:nvSpPr>
         <p:spPr>
           <a:xfrm>
-            <a:off x="751447" y="291515"/>
+            <a:off x="810064" y="336061"/>
             <a:ext cx="10515600" cy="689952"/>
           </a:xfrm>
           <a:prstGeom prst="rect">
@@ -5793,10 +5898,10 @@
       </p:sp>
       <p:sp>
         <p:nvSpPr>
-          <p:cNvPr id="5" name="Title 1">
-            <a:extLst>
-              <a:ext uri="{FF2B5EF4-FFF2-40B4-BE49-F238E27FC236}">
-                <a16:creationId xmlns:a16="http://schemas.microsoft.com/office/drawing/2014/main" id="{4CDCBA98-7704-ADDD-741A-84739891AC51}"/>
+          <p:cNvPr id="7" name="Title 1">
+            <a:extLst>
+              <a:ext uri="{FF2B5EF4-FFF2-40B4-BE49-F238E27FC236}">
+                <a16:creationId xmlns:a16="http://schemas.microsoft.com/office/drawing/2014/main" id="{7AE0CE8D-11FB-2995-0E11-915BFA339474}"/>
               </a:ext>
             </a:extLst>
           </p:cNvPr>
@@ -5807,7 +5912,7 @@
         </p:nvSpPr>
         <p:spPr>
           <a:xfrm>
-            <a:off x="793651" y="857345"/>
+            <a:off x="810064" y="1135673"/>
             <a:ext cx="10515600" cy="689952"/>
           </a:xfrm>
           <a:prstGeom prst="rect">
@@ -5840,17 +5945,17 @@
           <a:p>
             <a:r>
               <a:rPr lang="en-US" sz="2800" b="1" dirty="0"/>
-              <a:t>Use Case Diagram</a:t>
+              <a:t>Process Model</a:t>
             </a:r>
           </a:p>
         </p:txBody>
       </p:sp>
       <p:pic>
         <p:nvPicPr>
-          <p:cNvPr id="6" name="Picture 5">
-            <a:extLst>
-              <a:ext uri="{FF2B5EF4-FFF2-40B4-BE49-F238E27FC236}">
-                <a16:creationId xmlns:a16="http://schemas.microsoft.com/office/drawing/2014/main" id="{47847F47-53E9-A601-B31A-3D7D947129E7}"/>
+          <p:cNvPr id="8" name="Picture 7">
+            <a:extLst>
+              <a:ext uri="{FF2B5EF4-FFF2-40B4-BE49-F238E27FC236}">
+                <a16:creationId xmlns:a16="http://schemas.microsoft.com/office/drawing/2014/main" id="{CAC3C4D2-12EC-AB74-B665-F4F020A1B4F7}"/>
               </a:ext>
             </a:extLst>
           </p:cNvPr>
@@ -5873,8 +5978,8 @@
         </p:blipFill>
         <p:spPr>
           <a:xfrm>
-            <a:off x="2013658" y="981467"/>
-            <a:ext cx="6448425" cy="5622340"/>
+            <a:off x="838200" y="4350435"/>
+            <a:ext cx="8997531" cy="1882800"/>
           </a:xfrm>
           <a:prstGeom prst="rect">
             <a:avLst/>
@@ -5883,10 +5988,10 @@
       </p:pic>
       <p:sp>
         <p:nvSpPr>
-          <p:cNvPr id="7" name="Title 1">
-            <a:extLst>
-              <a:ext uri="{FF2B5EF4-FFF2-40B4-BE49-F238E27FC236}">
-                <a16:creationId xmlns:a16="http://schemas.microsoft.com/office/drawing/2014/main" id="{B3F77956-E0AA-4B7D-C8B8-A34D0F080386}"/>
+          <p:cNvPr id="6" name="Title 1">
+            <a:extLst>
+              <a:ext uri="{FF2B5EF4-FFF2-40B4-BE49-F238E27FC236}">
+                <a16:creationId xmlns:a16="http://schemas.microsoft.com/office/drawing/2014/main" id="{AE1E053D-E302-4ED8-9921-3209FE6DB7EF}"/>
               </a:ext>
             </a:extLst>
           </p:cNvPr>
@@ -5897,8 +6002,8 @@
         </p:nvSpPr>
         <p:spPr>
           <a:xfrm>
-            <a:off x="8711416" y="3968997"/>
-            <a:ext cx="3246122" cy="2028384"/>
+            <a:off x="2631003" y="6030301"/>
+            <a:ext cx="10515600" cy="689952"/>
           </a:xfrm>
           <a:prstGeom prst="rect">
             <a:avLst/>
@@ -5929,8 +6034,8 @@
           </a:lstStyle>
           <a:p>
             <a:r>
-              <a:rPr lang="en-US" sz="2800" b="1" dirty="0"/>
-              <a:t>The Use Case diagram models each interaction a user can perform with the system.</a:t>
+              <a:rPr lang="en-US" sz="1600" b="1" i="1" dirty="0"/>
+              <a:t>Figure by (Martin, 2020) in article “Prototype Model in Software Engineering”</a:t>
             </a:r>
           </a:p>
         </p:txBody>
@@ -5938,7 +6043,7 @@
     </p:spTree>
     <p:extLst>
       <p:ext uri="{BB962C8B-B14F-4D97-AF65-F5344CB8AC3E}">
-        <p14:creationId xmlns:p14="http://schemas.microsoft.com/office/powerpoint/2010/main" val="888403634"/>
+        <p14:creationId xmlns:p14="http://schemas.microsoft.com/office/powerpoint/2010/main" val="3223567328"/>
       </p:ext>
     </p:extLst>
   </p:cSld>
@@ -5970,7 +6075,7 @@
           <p:cNvPr id="4" name="Title 1">
             <a:extLst>
               <a:ext uri="{FF2B5EF4-FFF2-40B4-BE49-F238E27FC236}">
-                <a16:creationId xmlns:a16="http://schemas.microsoft.com/office/drawing/2014/main" id="{ECF7B0D9-4531-D42D-3015-E7299442945B}"/>
+                <a16:creationId xmlns:a16="http://schemas.microsoft.com/office/drawing/2014/main" id="{0739E809-6CA4-144F-66A0-3D5ECDA0A102}"/>
               </a:ext>
             </a:extLst>
           </p:cNvPr>
@@ -5981,7 +6086,7 @@
         </p:nvSpPr>
         <p:spPr>
           <a:xfrm>
-            <a:off x="720968" y="336061"/>
+            <a:off x="751447" y="291515"/>
             <a:ext cx="10515600" cy="689952"/>
           </a:xfrm>
           <a:prstGeom prst="rect">
@@ -6024,7 +6129,7 @@
           <p:cNvPr id="5" name="Title 1">
             <a:extLst>
               <a:ext uri="{FF2B5EF4-FFF2-40B4-BE49-F238E27FC236}">
-                <a16:creationId xmlns:a16="http://schemas.microsoft.com/office/drawing/2014/main" id="{41B95456-32AA-D48F-C330-286EA05DE2AB}"/>
+                <a16:creationId xmlns:a16="http://schemas.microsoft.com/office/drawing/2014/main" id="{4CDCBA98-7704-ADDD-741A-84739891AC51}"/>
               </a:ext>
             </a:extLst>
           </p:cNvPr>
@@ -6035,7 +6140,7 @@
         </p:nvSpPr>
         <p:spPr>
           <a:xfrm>
-            <a:off x="795996" y="866578"/>
+            <a:off x="793651" y="857345"/>
             <a:ext cx="10515600" cy="689952"/>
           </a:xfrm>
           <a:prstGeom prst="rect">
@@ -6068,17 +6173,53 @@
           <a:p>
             <a:r>
               <a:rPr lang="en-US" sz="2800" b="1" dirty="0"/>
-              <a:t>Activity Diagram</a:t>
-            </a:r>
-          </a:p>
-        </p:txBody>
-      </p:sp>
+              <a:t>Use Case Diagram</a:t>
+            </a:r>
+          </a:p>
+        </p:txBody>
+      </p:sp>
+      <p:pic>
+        <p:nvPicPr>
+          <p:cNvPr id="6" name="Picture 5">
+            <a:extLst>
+              <a:ext uri="{FF2B5EF4-FFF2-40B4-BE49-F238E27FC236}">
+                <a16:creationId xmlns:a16="http://schemas.microsoft.com/office/drawing/2014/main" id="{47847F47-53E9-A601-B31A-3D7D947129E7}"/>
+              </a:ext>
+            </a:extLst>
+          </p:cNvPr>
+          <p:cNvPicPr>
+            <a:picLocks noChangeAspect="1"/>
+          </p:cNvPicPr>
+          <p:nvPr/>
+        </p:nvPicPr>
+        <p:blipFill>
+          <a:blip r:embed="rId2">
+            <a:extLst>
+              <a:ext uri="{28A0092B-C50C-407E-A947-70E740481C1C}">
+                <a14:useLocalDpi xmlns:a14="http://schemas.microsoft.com/office/drawing/2010/main" val="0"/>
+              </a:ext>
+            </a:extLst>
+          </a:blip>
+          <a:stretch>
+            <a:fillRect/>
+          </a:stretch>
+        </p:blipFill>
+        <p:spPr>
+          <a:xfrm>
+            <a:off x="2013658" y="981467"/>
+            <a:ext cx="6448425" cy="5622340"/>
+          </a:xfrm>
+          <a:prstGeom prst="rect">
+            <a:avLst/>
+          </a:prstGeom>
+        </p:spPr>
+      </p:pic>
       <p:sp>
         <p:nvSpPr>
           <p:cNvPr id="7" name="Title 1">
             <a:extLst>
               <a:ext uri="{FF2B5EF4-FFF2-40B4-BE49-F238E27FC236}">
-                <a16:creationId xmlns:a16="http://schemas.microsoft.com/office/drawing/2014/main" id="{A8138B7A-9DDE-01FA-316F-61B4140287D4}"/>
+                <a16:creationId xmlns:a16="http://schemas.microsoft.com/office/drawing/2014/main" id="{B3F77956-E0AA-4B7D-C8B8-A34D0F080386}"/>
               </a:ext>
             </a:extLst>
           </p:cNvPr>
@@ -6089,7 +6230,7 @@
         </p:nvSpPr>
         <p:spPr>
           <a:xfrm>
-            <a:off x="8287041" y="4365384"/>
+            <a:off x="8711416" y="3968997"/>
             <a:ext cx="3246122" cy="2028384"/>
           </a:xfrm>
           <a:prstGeom prst="rect">
@@ -6122,51 +6263,15 @@
           <a:p>
             <a:r>
               <a:rPr lang="en-US" sz="2800" b="1" dirty="0"/>
-              <a:t>The Activity diagram models the software process in progressive order of actions.</a:t>
-            </a:r>
-          </a:p>
-        </p:txBody>
-      </p:sp>
-      <p:pic>
-        <p:nvPicPr>
-          <p:cNvPr id="3" name="Picture 2">
-            <a:extLst>
-              <a:ext uri="{FF2B5EF4-FFF2-40B4-BE49-F238E27FC236}">
-                <a16:creationId xmlns:a16="http://schemas.microsoft.com/office/drawing/2014/main" id="{66E10804-D620-81CB-3EB5-8620E73A45ED}"/>
-              </a:ext>
-            </a:extLst>
-          </p:cNvPr>
-          <p:cNvPicPr>
-            <a:picLocks noChangeAspect="1"/>
-          </p:cNvPicPr>
-          <p:nvPr/>
-        </p:nvPicPr>
-        <p:blipFill>
-          <a:blip r:embed="rId2">
-            <a:extLst>
-              <a:ext uri="{28A0092B-C50C-407E-A947-70E740481C1C}">
-                <a14:useLocalDpi xmlns:a14="http://schemas.microsoft.com/office/drawing/2010/main" val="0"/>
-              </a:ext>
-            </a:extLst>
-          </a:blip>
-          <a:stretch>
-            <a:fillRect/>
-          </a:stretch>
-        </p:blipFill>
-        <p:spPr>
-          <a:xfrm>
-            <a:off x="1765300" y="336061"/>
-            <a:ext cx="8132363" cy="6521939"/>
-          </a:xfrm>
-          <a:prstGeom prst="rect">
-            <a:avLst/>
-          </a:prstGeom>
-        </p:spPr>
-      </p:pic>
+              <a:t>The Use Case diagram models each interaction a user can perform with the system.</a:t>
+            </a:r>
+          </a:p>
+        </p:txBody>
+      </p:sp>
     </p:spTree>
     <p:extLst>
       <p:ext uri="{BB962C8B-B14F-4D97-AF65-F5344CB8AC3E}">
-        <p14:creationId xmlns:p14="http://schemas.microsoft.com/office/powerpoint/2010/main" val="41378811"/>
+        <p14:creationId xmlns:p14="http://schemas.microsoft.com/office/powerpoint/2010/main" val="888403634"/>
       </p:ext>
     </p:extLst>
   </p:cSld>
@@ -6195,121 +6300,21 @@
       </p:grpSpPr>
       <p:sp>
         <p:nvSpPr>
-          <p:cNvPr id="3" name="Content Placeholder 2">
-            <a:extLst>
-              <a:ext uri="{FF2B5EF4-FFF2-40B4-BE49-F238E27FC236}">
-                <a16:creationId xmlns:a16="http://schemas.microsoft.com/office/drawing/2014/main" id="{BBF4E5E7-0C81-CE50-AA25-17953BC8903E}"/>
-              </a:ext>
-            </a:extLst>
-          </p:cNvPr>
-          <p:cNvSpPr>
-            <a:spLocks noGrp="1"/>
-          </p:cNvSpPr>
-          <p:nvPr>
-            <p:ph idx="1"/>
-          </p:nvPr>
+          <p:cNvPr id="4" name="Title 1">
+            <a:extLst>
+              <a:ext uri="{FF2B5EF4-FFF2-40B4-BE49-F238E27FC236}">
+                <a16:creationId xmlns:a16="http://schemas.microsoft.com/office/drawing/2014/main" id="{ECF7B0D9-4531-D42D-3015-E7299442945B}"/>
+              </a:ext>
+            </a:extLst>
+          </p:cNvPr>
+          <p:cNvSpPr txBox="1">
+            <a:spLocks/>
+          </p:cNvSpPr>
+          <p:nvPr/>
         </p:nvSpPr>
         <p:spPr>
           <a:xfrm>
-            <a:off x="838200" y="1825625"/>
-            <a:ext cx="10515600" cy="4351338"/>
-          </a:xfrm>
-        </p:spPr>
-        <p:txBody>
-          <a:bodyPr>
-            <a:normAutofit fontScale="92500"/>
-          </a:bodyPr>
-          <a:lstStyle/>
-          <a:p>
-            <a:pPr marL="0" indent="0">
-              <a:buNone/>
-            </a:pPr>
-            <a:r>
-              <a:rPr lang="en-US" dirty="0"/>
-              <a:t>The design/implementation tools for this system include:</a:t>
-            </a:r>
-          </a:p>
-          <a:p>
-            <a:r>
-              <a:rPr lang="en-US" dirty="0"/>
-              <a:t>Microsoft Visual Studio Code: Integrated Development Environment.</a:t>
-            </a:r>
-          </a:p>
-          <a:p>
-            <a:r>
-              <a:rPr lang="en-US" dirty="0"/>
-              <a:t>Sci-kit Learn: Python Machine Learning library (</a:t>
-            </a:r>
-            <a:r>
-              <a:rPr lang="en-US" dirty="0" err="1"/>
-              <a:t>Lng</a:t>
-            </a:r>
-            <a:r>
-              <a:rPr lang="en-US" dirty="0"/>
-              <a:t>. detection)</a:t>
-            </a:r>
-          </a:p>
-          <a:p>
-            <a:r>
-              <a:rPr lang="en-US" dirty="0"/>
-              <a:t>NLTK: Python Natural language processing library (Topic pred. &amp; Summary)</a:t>
-            </a:r>
-          </a:p>
-          <a:p>
-            <a:r>
-              <a:rPr lang="en-US" dirty="0"/>
-              <a:t>Flask: Python Back-end library/Framework</a:t>
-            </a:r>
-          </a:p>
-          <a:p>
-            <a:r>
-              <a:rPr lang="en-US" dirty="0"/>
-              <a:t>HTML: Front-end structure definition.</a:t>
-            </a:r>
-          </a:p>
-          <a:p>
-            <a:r>
-              <a:rPr lang="en-US" dirty="0"/>
-              <a:t>CSS: Front-end structure design.</a:t>
-            </a:r>
-          </a:p>
-          <a:p>
-            <a:r>
-              <a:rPr lang="en-US" dirty="0"/>
-              <a:t>JavaScript: Front-end dynamic content management.</a:t>
-            </a:r>
-          </a:p>
-          <a:p>
-            <a:r>
-              <a:rPr lang="en-US" dirty="0"/>
-              <a:t>Figma: UI/UX design</a:t>
-            </a:r>
-          </a:p>
-          <a:p>
-            <a:pPr marL="0" indent="0">
-              <a:buNone/>
-            </a:pPr>
-            <a:endParaRPr lang="en-US" dirty="0"/>
-          </a:p>
-        </p:txBody>
-      </p:sp>
-      <p:sp>
-        <p:nvSpPr>
-          <p:cNvPr id="4" name="Title 1">
-            <a:extLst>
-              <a:ext uri="{FF2B5EF4-FFF2-40B4-BE49-F238E27FC236}">
-                <a16:creationId xmlns:a16="http://schemas.microsoft.com/office/drawing/2014/main" id="{3382EF16-CF2C-0284-70B4-76B21E0F80D7}"/>
-              </a:ext>
-            </a:extLst>
-          </p:cNvPr>
-          <p:cNvSpPr txBox="1">
-            <a:spLocks/>
-          </p:cNvSpPr>
-          <p:nvPr/>
-        </p:nvSpPr>
-        <p:spPr>
-          <a:xfrm>
-            <a:off x="838200" y="336061"/>
+            <a:off x="720968" y="336061"/>
             <a:ext cx="10515600" cy="689952"/>
           </a:xfrm>
           <a:prstGeom prst="rect">
@@ -6341,7 +6346,7 @@
           </a:lstStyle>
           <a:p>
             <a:r>
-              <a:rPr lang="en-US" sz="4300" b="1" dirty="0"/>
+              <a:rPr lang="en-US" b="1" dirty="0"/>
               <a:t>Methodology.</a:t>
             </a:r>
           </a:p>
@@ -6352,7 +6357,7 @@
           <p:cNvPr id="5" name="Title 1">
             <a:extLst>
               <a:ext uri="{FF2B5EF4-FFF2-40B4-BE49-F238E27FC236}">
-                <a16:creationId xmlns:a16="http://schemas.microsoft.com/office/drawing/2014/main" id="{6610BD88-4B4B-2708-7656-7680550616F1}"/>
+                <a16:creationId xmlns:a16="http://schemas.microsoft.com/office/drawing/2014/main" id="{41B95456-32AA-D48F-C330-286EA05DE2AB}"/>
               </a:ext>
             </a:extLst>
           </p:cNvPr>
@@ -6363,7 +6368,7 @@
         </p:nvSpPr>
         <p:spPr>
           <a:xfrm>
-            <a:off x="838200" y="809770"/>
+            <a:off x="795996" y="866578"/>
             <a:ext cx="10515600" cy="689952"/>
           </a:xfrm>
           <a:prstGeom prst="rect">
@@ -6396,15 +6401,105 @@
           <a:p>
             <a:r>
               <a:rPr lang="en-US" sz="2800" b="1" dirty="0"/>
-              <a:t>Design/Implementation Tools</a:t>
-            </a:r>
-          </a:p>
-        </p:txBody>
-      </p:sp>
+              <a:t>Activity Diagram</a:t>
+            </a:r>
+          </a:p>
+        </p:txBody>
+      </p:sp>
+      <p:sp>
+        <p:nvSpPr>
+          <p:cNvPr id="7" name="Title 1">
+            <a:extLst>
+              <a:ext uri="{FF2B5EF4-FFF2-40B4-BE49-F238E27FC236}">
+                <a16:creationId xmlns:a16="http://schemas.microsoft.com/office/drawing/2014/main" id="{A8138B7A-9DDE-01FA-316F-61B4140287D4}"/>
+              </a:ext>
+            </a:extLst>
+          </p:cNvPr>
+          <p:cNvSpPr txBox="1">
+            <a:spLocks/>
+          </p:cNvSpPr>
+          <p:nvPr/>
+        </p:nvSpPr>
+        <p:spPr>
+          <a:xfrm>
+            <a:off x="8287041" y="4365384"/>
+            <a:ext cx="3246122" cy="2028384"/>
+          </a:xfrm>
+          <a:prstGeom prst="rect">
+            <a:avLst/>
+          </a:prstGeom>
+        </p:spPr>
+        <p:txBody>
+          <a:bodyPr vert="horz" lIns="91440" tIns="45720" rIns="91440" bIns="45720" rtlCol="0" anchor="ctr">
+            <a:normAutofit fontScale="97500"/>
+          </a:bodyPr>
+          <a:lstStyle>
+            <a:lvl1pPr algn="l" defTabSz="914400" rtl="0" eaLnBrk="1" latinLnBrk="0" hangingPunct="1">
+              <a:lnSpc>
+                <a:spcPct val="90000"/>
+              </a:lnSpc>
+              <a:spcBef>
+                <a:spcPct val="0"/>
+              </a:spcBef>
+              <a:buNone/>
+              <a:defRPr sz="4400" kern="1200">
+                <a:solidFill>
+                  <a:schemeClr val="tx1"/>
+                </a:solidFill>
+                <a:latin typeface="+mj-lt"/>
+                <a:ea typeface="+mj-ea"/>
+                <a:cs typeface="+mj-cs"/>
+              </a:defRPr>
+            </a:lvl1pPr>
+          </a:lstStyle>
+          <a:p>
+            <a:r>
+              <a:rPr lang="en-US" sz="2800" b="1" dirty="0"/>
+              <a:t>The Activity diagram models the software process in progressive order of actions.</a:t>
+            </a:r>
+          </a:p>
+        </p:txBody>
+      </p:sp>
+      <p:pic>
+        <p:nvPicPr>
+          <p:cNvPr id="3" name="Picture 2">
+            <a:extLst>
+              <a:ext uri="{FF2B5EF4-FFF2-40B4-BE49-F238E27FC236}">
+                <a16:creationId xmlns:a16="http://schemas.microsoft.com/office/drawing/2014/main" id="{66E10804-D620-81CB-3EB5-8620E73A45ED}"/>
+              </a:ext>
+            </a:extLst>
+          </p:cNvPr>
+          <p:cNvPicPr>
+            <a:picLocks noChangeAspect="1"/>
+          </p:cNvPicPr>
+          <p:nvPr/>
+        </p:nvPicPr>
+        <p:blipFill>
+          <a:blip r:embed="rId2">
+            <a:extLst>
+              <a:ext uri="{28A0092B-C50C-407E-A947-70E740481C1C}">
+                <a14:useLocalDpi xmlns:a14="http://schemas.microsoft.com/office/drawing/2010/main" val="0"/>
+              </a:ext>
+            </a:extLst>
+          </a:blip>
+          <a:stretch>
+            <a:fillRect/>
+          </a:stretch>
+        </p:blipFill>
+        <p:spPr>
+          <a:xfrm>
+            <a:off x="1765300" y="336061"/>
+            <a:ext cx="8132363" cy="6521939"/>
+          </a:xfrm>
+          <a:prstGeom prst="rect">
+            <a:avLst/>
+          </a:prstGeom>
+        </p:spPr>
+      </p:pic>
     </p:spTree>
     <p:extLst>
       <p:ext uri="{BB962C8B-B14F-4D97-AF65-F5344CB8AC3E}">
-        <p14:creationId xmlns:p14="http://schemas.microsoft.com/office/powerpoint/2010/main" val="3873210646"/>
+        <p14:creationId xmlns:p14="http://schemas.microsoft.com/office/powerpoint/2010/main" val="41378811"/>
       </p:ext>
     </p:extLst>
   </p:cSld>

</xml_diff>